<commit_message>
I.Fix wrong description in docx: forgot that the instruction set can directly store the data in RAM into R0, resulting in an extra step of writing. II.Introducing 8bit instruction set v2.
</commit_message>
<xml_diff>
--- a/8bit_design/InstructionSet.pptx
+++ b/8bit_design/InstructionSet.pptx
@@ -6,6 +6,7 @@
   </p:sldMasterIdLst>
   <p:sldIdLst>
     <p:sldId id="256" r:id="rId2"/>
+    <p:sldId id="257" r:id="rId3"/>
   </p:sldIdLst>
   <p:sldSz cx="12192000" cy="6858000"/>
   <p:notesSz cx="6858000" cy="9144000"/>
@@ -259,7 +260,7 @@
           <a:p>
             <a:fld id="{EB96173F-77D8-3A4A-B83C-B33723880ECE}" type="datetimeFigureOut">
               <a:rPr kumimoji="1" lang="zh-CN" altLang="en-US" smtClean="0"/>
-              <a:t>2024/1/16</a:t>
+              <a:t>2024/2/15</a:t>
             </a:fld>
             <a:endParaRPr kumimoji="1" lang="zh-CN" altLang="en-US"/>
           </a:p>
@@ -457,7 +458,7 @@
           <a:p>
             <a:fld id="{EB96173F-77D8-3A4A-B83C-B33723880ECE}" type="datetimeFigureOut">
               <a:rPr kumimoji="1" lang="zh-CN" altLang="en-US" smtClean="0"/>
-              <a:t>2024/1/16</a:t>
+              <a:t>2024/2/15</a:t>
             </a:fld>
             <a:endParaRPr kumimoji="1" lang="zh-CN" altLang="en-US"/>
           </a:p>
@@ -665,7 +666,7 @@
           <a:p>
             <a:fld id="{EB96173F-77D8-3A4A-B83C-B33723880ECE}" type="datetimeFigureOut">
               <a:rPr kumimoji="1" lang="zh-CN" altLang="en-US" smtClean="0"/>
-              <a:t>2024/1/16</a:t>
+              <a:t>2024/2/15</a:t>
             </a:fld>
             <a:endParaRPr kumimoji="1" lang="zh-CN" altLang="en-US"/>
           </a:p>
@@ -863,7 +864,7 @@
           <a:p>
             <a:fld id="{EB96173F-77D8-3A4A-B83C-B33723880ECE}" type="datetimeFigureOut">
               <a:rPr kumimoji="1" lang="zh-CN" altLang="en-US" smtClean="0"/>
-              <a:t>2024/1/16</a:t>
+              <a:t>2024/2/15</a:t>
             </a:fld>
             <a:endParaRPr kumimoji="1" lang="zh-CN" altLang="en-US"/>
           </a:p>
@@ -1138,7 +1139,7 @@
           <a:p>
             <a:fld id="{EB96173F-77D8-3A4A-B83C-B33723880ECE}" type="datetimeFigureOut">
               <a:rPr kumimoji="1" lang="zh-CN" altLang="en-US" smtClean="0"/>
-              <a:t>2024/1/16</a:t>
+              <a:t>2024/2/15</a:t>
             </a:fld>
             <a:endParaRPr kumimoji="1" lang="zh-CN" altLang="en-US"/>
           </a:p>
@@ -1403,7 +1404,7 @@
           <a:p>
             <a:fld id="{EB96173F-77D8-3A4A-B83C-B33723880ECE}" type="datetimeFigureOut">
               <a:rPr kumimoji="1" lang="zh-CN" altLang="en-US" smtClean="0"/>
-              <a:t>2024/1/16</a:t>
+              <a:t>2024/2/15</a:t>
             </a:fld>
             <a:endParaRPr kumimoji="1" lang="zh-CN" altLang="en-US"/>
           </a:p>
@@ -1815,7 +1816,7 @@
           <a:p>
             <a:fld id="{EB96173F-77D8-3A4A-B83C-B33723880ECE}" type="datetimeFigureOut">
               <a:rPr kumimoji="1" lang="zh-CN" altLang="en-US" smtClean="0"/>
-              <a:t>2024/1/16</a:t>
+              <a:t>2024/2/15</a:t>
             </a:fld>
             <a:endParaRPr kumimoji="1" lang="zh-CN" altLang="en-US"/>
           </a:p>
@@ -1956,7 +1957,7 @@
           <a:p>
             <a:fld id="{EB96173F-77D8-3A4A-B83C-B33723880ECE}" type="datetimeFigureOut">
               <a:rPr kumimoji="1" lang="zh-CN" altLang="en-US" smtClean="0"/>
-              <a:t>2024/1/16</a:t>
+              <a:t>2024/2/15</a:t>
             </a:fld>
             <a:endParaRPr kumimoji="1" lang="zh-CN" altLang="en-US"/>
           </a:p>
@@ -2069,7 +2070,7 @@
           <a:p>
             <a:fld id="{EB96173F-77D8-3A4A-B83C-B33723880ECE}" type="datetimeFigureOut">
               <a:rPr kumimoji="1" lang="zh-CN" altLang="en-US" smtClean="0"/>
-              <a:t>2024/1/16</a:t>
+              <a:t>2024/2/15</a:t>
             </a:fld>
             <a:endParaRPr kumimoji="1" lang="zh-CN" altLang="en-US"/>
           </a:p>
@@ -2380,7 +2381,7 @@
           <a:p>
             <a:fld id="{EB96173F-77D8-3A4A-B83C-B33723880ECE}" type="datetimeFigureOut">
               <a:rPr kumimoji="1" lang="zh-CN" altLang="en-US" smtClean="0"/>
-              <a:t>2024/1/16</a:t>
+              <a:t>2024/2/15</a:t>
             </a:fld>
             <a:endParaRPr kumimoji="1" lang="zh-CN" altLang="en-US"/>
           </a:p>
@@ -2668,7 +2669,7 @@
           <a:p>
             <a:fld id="{EB96173F-77D8-3A4A-B83C-B33723880ECE}" type="datetimeFigureOut">
               <a:rPr kumimoji="1" lang="zh-CN" altLang="en-US" smtClean="0"/>
-              <a:t>2024/1/16</a:t>
+              <a:t>2024/2/15</a:t>
             </a:fld>
             <a:endParaRPr kumimoji="1" lang="zh-CN" altLang="en-US"/>
           </a:p>
@@ -2909,7 +2910,7 @@
           <a:p>
             <a:fld id="{EB96173F-77D8-3A4A-B83C-B33723880ECE}" type="datetimeFigureOut">
               <a:rPr kumimoji="1" lang="zh-CN" altLang="en-US" smtClean="0"/>
-              <a:t>2024/1/16</a:t>
+              <a:t>2024/2/15</a:t>
             </a:fld>
             <a:endParaRPr kumimoji="1" lang="zh-CN" altLang="en-US"/>
           </a:p>
@@ -4659,6 +4660,1338 @@
 </p:sld>
 </file>
 
+<file path=ppt/slides/slide2.xml><?xml version="1.0" encoding="utf-8"?>
+<p:sld xmlns:a="http://schemas.openxmlformats.org/drawingml/2006/main" xmlns:r="http://schemas.openxmlformats.org/officeDocument/2006/relationships" xmlns:p="http://schemas.openxmlformats.org/presentationml/2006/main">
+  <p:cSld>
+    <p:spTree>
+      <p:nvGrpSpPr>
+        <p:cNvPr id="1" name="">
+          <a:extLst>
+            <a:ext uri="{FF2B5EF4-FFF2-40B4-BE49-F238E27FC236}">
+              <a16:creationId xmlns:a16="http://schemas.microsoft.com/office/drawing/2014/main" id="{BCCFF416-E657-6D28-4636-27DAE56CAF1D}"/>
+            </a:ext>
+          </a:extLst>
+        </p:cNvPr>
+        <p:cNvGrpSpPr/>
+        <p:nvPr/>
+      </p:nvGrpSpPr>
+      <p:grpSpPr>
+        <a:xfrm>
+          <a:off x="0" y="0"/>
+          <a:ext cx="0" cy="0"/>
+          <a:chOff x="0" y="0"/>
+          <a:chExt cx="0" cy="0"/>
+        </a:xfrm>
+      </p:grpSpPr>
+      <p:graphicFrame>
+        <p:nvGraphicFramePr>
+          <p:cNvPr id="4" name="表格 3">
+            <a:extLst>
+              <a:ext uri="{FF2B5EF4-FFF2-40B4-BE49-F238E27FC236}">
+                <a16:creationId xmlns:a16="http://schemas.microsoft.com/office/drawing/2014/main" id="{2BFB8707-3D10-C65F-8F23-96930342E3A5}"/>
+              </a:ext>
+            </a:extLst>
+          </p:cNvPr>
+          <p:cNvGraphicFramePr>
+            <a:graphicFrameLocks noGrp="1"/>
+          </p:cNvGraphicFramePr>
+          <p:nvPr/>
+        </p:nvGraphicFramePr>
+        <p:xfrm>
+          <a:off x="2032000" y="719666"/>
+          <a:ext cx="8128000" cy="370840"/>
+        </p:xfrm>
+        <a:graphic>
+          <a:graphicData uri="http://schemas.openxmlformats.org/drawingml/2006/table">
+            <a:tbl>
+              <a:tblPr firstRow="1" bandRow="1">
+                <a:tableStyleId>{073A0DAA-6AF3-43AB-8588-CEC1D06C72B9}</a:tableStyleId>
+              </a:tblPr>
+              <a:tblGrid>
+                <a:gridCol w="1016000">
+                  <a:extLst>
+                    <a:ext uri="{9D8B030D-6E8A-4147-A177-3AD203B41FA5}">
+                      <a16:colId xmlns:a16="http://schemas.microsoft.com/office/drawing/2014/main" val="3852944460"/>
+                    </a:ext>
+                  </a:extLst>
+                </a:gridCol>
+                <a:gridCol w="7112000">
+                  <a:extLst>
+                    <a:ext uri="{9D8B030D-6E8A-4147-A177-3AD203B41FA5}">
+                      <a16:colId xmlns:a16="http://schemas.microsoft.com/office/drawing/2014/main" val="1131242746"/>
+                    </a:ext>
+                  </a:extLst>
+                </a:gridCol>
+              </a:tblGrid>
+              <a:tr h="370840">
+                <a:tc>
+                  <a:txBody>
+                    <a:bodyPr/>
+                    <a:lstStyle/>
+                    <a:p>
+                      <a:pPr algn="ctr"/>
+                      <a:r>
+                        <a:rPr lang="en-US" altLang="zh-CN" b="0" dirty="0">
+                          <a:ln>
+                            <a:solidFill>
+                              <a:schemeClr val="tx1"/>
+                            </a:solidFill>
+                          </a:ln>
+                          <a:solidFill>
+                            <a:schemeClr val="tx1"/>
+                          </a:solidFill>
+                        </a:rPr>
+                        <a:t>0</a:t>
+                      </a:r>
+                      <a:endParaRPr lang="zh-CN" altLang="en-US" b="0" dirty="0">
+                        <a:ln>
+                          <a:solidFill>
+                            <a:schemeClr val="tx1"/>
+                          </a:solidFill>
+                        </a:ln>
+                        <a:solidFill>
+                          <a:schemeClr val="tx1"/>
+                        </a:solidFill>
+                      </a:endParaRPr>
+                    </a:p>
+                  </a:txBody>
+                  <a:tcPr>
+                    <a:lnL w="12700" cap="flat" cmpd="sng" algn="ctr">
+                      <a:solidFill>
+                        <a:schemeClr val="tx1"/>
+                      </a:solidFill>
+                      <a:prstDash val="solid"/>
+                      <a:round/>
+                      <a:headEnd type="none" w="med" len="med"/>
+                      <a:tailEnd type="none" w="med" len="med"/>
+                    </a:lnL>
+                    <a:lnR w="12700" cap="flat" cmpd="sng" algn="ctr">
+                      <a:solidFill>
+                        <a:schemeClr val="tx1"/>
+                      </a:solidFill>
+                      <a:prstDash val="solid"/>
+                      <a:round/>
+                      <a:headEnd type="none" w="med" len="med"/>
+                      <a:tailEnd type="none" w="med" len="med"/>
+                    </a:lnR>
+                    <a:lnT w="12700" cap="flat" cmpd="sng" algn="ctr">
+                      <a:solidFill>
+                        <a:schemeClr val="tx1"/>
+                      </a:solidFill>
+                      <a:prstDash val="solid"/>
+                      <a:round/>
+                      <a:headEnd type="none" w="med" len="med"/>
+                      <a:tailEnd type="none" w="med" len="med"/>
+                    </a:lnT>
+                    <a:lnB w="12700" cap="flat" cmpd="sng" algn="ctr">
+                      <a:solidFill>
+                        <a:schemeClr val="tx1"/>
+                      </a:solidFill>
+                      <a:prstDash val="solid"/>
+                      <a:round/>
+                      <a:headEnd type="none" w="med" len="med"/>
+                      <a:tailEnd type="none" w="med" len="med"/>
+                    </a:lnB>
+                    <a:lnTlToBr w="12700" cmpd="sng">
+                      <a:noFill/>
+                      <a:prstDash val="solid"/>
+                    </a:lnTlToBr>
+                    <a:lnBlToTr w="12700" cmpd="sng">
+                      <a:noFill/>
+                      <a:prstDash val="solid"/>
+                    </a:lnBlToTr>
+                    <a:solidFill>
+                      <a:schemeClr val="bg1"/>
+                    </a:solidFill>
+                  </a:tcPr>
+                </a:tc>
+                <a:tc>
+                  <a:txBody>
+                    <a:bodyPr/>
+                    <a:lstStyle/>
+                    <a:p>
+                      <a:pPr algn="ctr"/>
+                      <a:r>
+                        <a:rPr lang="en-US" altLang="zh-CN" b="0" dirty="0">
+                          <a:ln>
+                            <a:solidFill>
+                              <a:schemeClr val="tx1"/>
+                            </a:solidFill>
+                          </a:ln>
+                          <a:solidFill>
+                            <a:schemeClr val="tx1"/>
+                          </a:solidFill>
+                        </a:rPr>
+                        <a:t>Rm</a:t>
+                      </a:r>
+                      <a:endParaRPr lang="zh-CN" altLang="en-US" b="0" dirty="0">
+                        <a:ln>
+                          <a:solidFill>
+                            <a:schemeClr val="tx1"/>
+                          </a:solidFill>
+                        </a:ln>
+                        <a:solidFill>
+                          <a:schemeClr val="tx1"/>
+                        </a:solidFill>
+                      </a:endParaRPr>
+                    </a:p>
+                  </a:txBody>
+                  <a:tcPr>
+                    <a:lnL w="12700" cap="flat" cmpd="sng" algn="ctr">
+                      <a:solidFill>
+                        <a:schemeClr val="tx1"/>
+                      </a:solidFill>
+                      <a:prstDash val="solid"/>
+                      <a:round/>
+                      <a:headEnd type="none" w="med" len="med"/>
+                      <a:tailEnd type="none" w="med" len="med"/>
+                    </a:lnL>
+                    <a:lnR w="12700" cap="flat" cmpd="sng" algn="ctr">
+                      <a:solidFill>
+                        <a:schemeClr val="tx1"/>
+                      </a:solidFill>
+                      <a:prstDash val="solid"/>
+                      <a:round/>
+                      <a:headEnd type="none" w="med" len="med"/>
+                      <a:tailEnd type="none" w="med" len="med"/>
+                    </a:lnR>
+                    <a:lnT w="12700" cap="flat" cmpd="sng" algn="ctr">
+                      <a:solidFill>
+                        <a:schemeClr val="tx1"/>
+                      </a:solidFill>
+                      <a:prstDash val="solid"/>
+                      <a:round/>
+                      <a:headEnd type="none" w="med" len="med"/>
+                      <a:tailEnd type="none" w="med" len="med"/>
+                    </a:lnT>
+                    <a:lnB w="12700" cap="flat" cmpd="sng" algn="ctr">
+                      <a:solidFill>
+                        <a:schemeClr val="tx1"/>
+                      </a:solidFill>
+                      <a:prstDash val="solid"/>
+                      <a:round/>
+                      <a:headEnd type="none" w="med" len="med"/>
+                      <a:tailEnd type="none" w="med" len="med"/>
+                    </a:lnB>
+                    <a:lnTlToBr w="12700" cmpd="sng">
+                      <a:noFill/>
+                      <a:prstDash val="solid"/>
+                    </a:lnTlToBr>
+                    <a:lnBlToTr w="12700" cmpd="sng">
+                      <a:noFill/>
+                      <a:prstDash val="solid"/>
+                    </a:lnBlToTr>
+                    <a:solidFill>
+                      <a:schemeClr val="bg1"/>
+                    </a:solidFill>
+                  </a:tcPr>
+                </a:tc>
+                <a:extLst>
+                  <a:ext uri="{0D108BD9-81ED-4DB2-BD59-A6C34878D82A}">
+                    <a16:rowId xmlns:a16="http://schemas.microsoft.com/office/drawing/2014/main" val="441353489"/>
+                  </a:ext>
+                </a:extLst>
+              </a:tr>
+            </a:tbl>
+          </a:graphicData>
+        </a:graphic>
+      </p:graphicFrame>
+      <p:sp>
+        <p:nvSpPr>
+          <p:cNvPr id="5" name="文本框 4">
+            <a:extLst>
+              <a:ext uri="{FF2B5EF4-FFF2-40B4-BE49-F238E27FC236}">
+                <a16:creationId xmlns:a16="http://schemas.microsoft.com/office/drawing/2014/main" id="{94FF683A-764C-5C95-5D90-E7FAC05FC9E9}"/>
+              </a:ext>
+            </a:extLst>
+          </p:cNvPr>
+          <p:cNvSpPr txBox="1"/>
+          <p:nvPr/>
+        </p:nvSpPr>
+        <p:spPr>
+          <a:xfrm>
+            <a:off x="2411073" y="350472"/>
+            <a:ext cx="306494" cy="369332"/>
+          </a:xfrm>
+          <a:prstGeom prst="rect">
+            <a:avLst/>
+          </a:prstGeom>
+          <a:noFill/>
+        </p:spPr>
+        <p:txBody>
+          <a:bodyPr wrap="none" rtlCol="0">
+            <a:spAutoFit/>
+          </a:bodyPr>
+          <a:lstStyle/>
+          <a:p>
+            <a:r>
+              <a:rPr kumimoji="1" lang="en-US" altLang="zh-CN" dirty="0"/>
+              <a:t>7</a:t>
+            </a:r>
+            <a:endParaRPr kumimoji="1" lang="zh-CN" altLang="en-US" dirty="0"/>
+          </a:p>
+        </p:txBody>
+      </p:sp>
+      <p:sp>
+        <p:nvSpPr>
+          <p:cNvPr id="6" name="文本框 5">
+            <a:extLst>
+              <a:ext uri="{FF2B5EF4-FFF2-40B4-BE49-F238E27FC236}">
+                <a16:creationId xmlns:a16="http://schemas.microsoft.com/office/drawing/2014/main" id="{A3B1AA4A-DD86-DE8A-9439-A181BE97869A}"/>
+              </a:ext>
+            </a:extLst>
+          </p:cNvPr>
+          <p:cNvSpPr txBox="1"/>
+          <p:nvPr/>
+        </p:nvSpPr>
+        <p:spPr>
+          <a:xfrm>
+            <a:off x="3009733" y="350334"/>
+            <a:ext cx="306494" cy="369332"/>
+          </a:xfrm>
+          <a:prstGeom prst="rect">
+            <a:avLst/>
+          </a:prstGeom>
+          <a:noFill/>
+        </p:spPr>
+        <p:txBody>
+          <a:bodyPr wrap="none" rtlCol="0">
+            <a:spAutoFit/>
+          </a:bodyPr>
+          <a:lstStyle/>
+          <a:p>
+            <a:r>
+              <a:rPr kumimoji="1" lang="en-US" altLang="zh-CN" dirty="0"/>
+              <a:t>6</a:t>
+            </a:r>
+            <a:endParaRPr kumimoji="1" lang="zh-CN" altLang="en-US" dirty="0"/>
+          </a:p>
+        </p:txBody>
+      </p:sp>
+      <p:sp>
+        <p:nvSpPr>
+          <p:cNvPr id="9" name="文本框 8">
+            <a:extLst>
+              <a:ext uri="{FF2B5EF4-FFF2-40B4-BE49-F238E27FC236}">
+                <a16:creationId xmlns:a16="http://schemas.microsoft.com/office/drawing/2014/main" id="{9D480426-9370-E370-5D6F-8B6FC74CE832}"/>
+              </a:ext>
+            </a:extLst>
+          </p:cNvPr>
+          <p:cNvSpPr txBox="1"/>
+          <p:nvPr/>
+        </p:nvSpPr>
+        <p:spPr>
+          <a:xfrm>
+            <a:off x="9911658" y="350472"/>
+            <a:ext cx="306494" cy="369332"/>
+          </a:xfrm>
+          <a:prstGeom prst="rect">
+            <a:avLst/>
+          </a:prstGeom>
+          <a:noFill/>
+        </p:spPr>
+        <p:txBody>
+          <a:bodyPr wrap="none" rtlCol="0">
+            <a:spAutoFit/>
+          </a:bodyPr>
+          <a:lstStyle/>
+          <a:p>
+            <a:r>
+              <a:rPr kumimoji="1" lang="en-US" altLang="zh-CN" dirty="0"/>
+              <a:t>0</a:t>
+            </a:r>
+            <a:endParaRPr kumimoji="1" lang="zh-CN" altLang="en-US" dirty="0"/>
+          </a:p>
+        </p:txBody>
+      </p:sp>
+      <p:graphicFrame>
+        <p:nvGraphicFramePr>
+          <p:cNvPr id="11" name="表格 10">
+            <a:extLst>
+              <a:ext uri="{FF2B5EF4-FFF2-40B4-BE49-F238E27FC236}">
+                <a16:creationId xmlns:a16="http://schemas.microsoft.com/office/drawing/2014/main" id="{F90CB59B-F98B-2B47-8944-B1BC356F0E1C}"/>
+              </a:ext>
+            </a:extLst>
+          </p:cNvPr>
+          <p:cNvGraphicFramePr>
+            <a:graphicFrameLocks noGrp="1"/>
+          </p:cNvGraphicFramePr>
+          <p:nvPr/>
+        </p:nvGraphicFramePr>
+        <p:xfrm>
+          <a:off x="2032000" y="1557866"/>
+          <a:ext cx="8128000" cy="370840"/>
+        </p:xfrm>
+        <a:graphic>
+          <a:graphicData uri="http://schemas.openxmlformats.org/drawingml/2006/table">
+            <a:tbl>
+              <a:tblPr firstRow="1" bandRow="1">
+                <a:tableStyleId>{073A0DAA-6AF3-43AB-8588-CEC1D06C72B9}</a:tableStyleId>
+              </a:tblPr>
+              <a:tblGrid>
+                <a:gridCol w="1016000">
+                  <a:extLst>
+                    <a:ext uri="{9D8B030D-6E8A-4147-A177-3AD203B41FA5}">
+                      <a16:colId xmlns:a16="http://schemas.microsoft.com/office/drawing/2014/main" val="3852944460"/>
+                    </a:ext>
+                  </a:extLst>
+                </a:gridCol>
+                <a:gridCol w="2032000">
+                  <a:extLst>
+                    <a:ext uri="{9D8B030D-6E8A-4147-A177-3AD203B41FA5}">
+                      <a16:colId xmlns:a16="http://schemas.microsoft.com/office/drawing/2014/main" val="1131242746"/>
+                    </a:ext>
+                  </a:extLst>
+                </a:gridCol>
+                <a:gridCol w="3048000">
+                  <a:extLst>
+                    <a:ext uri="{9D8B030D-6E8A-4147-A177-3AD203B41FA5}">
+                      <a16:colId xmlns:a16="http://schemas.microsoft.com/office/drawing/2014/main" val="2070543707"/>
+                    </a:ext>
+                  </a:extLst>
+                </a:gridCol>
+                <a:gridCol w="2032000">
+                  <a:extLst>
+                    <a:ext uri="{9D8B030D-6E8A-4147-A177-3AD203B41FA5}">
+                      <a16:colId xmlns:a16="http://schemas.microsoft.com/office/drawing/2014/main" val="3471788575"/>
+                    </a:ext>
+                  </a:extLst>
+                </a:gridCol>
+              </a:tblGrid>
+              <a:tr h="370840">
+                <a:tc>
+                  <a:txBody>
+                    <a:bodyPr/>
+                    <a:lstStyle/>
+                    <a:p>
+                      <a:pPr algn="ctr"/>
+                      <a:r>
+                        <a:rPr lang="en-US" altLang="zh-CN" b="0" dirty="0">
+                          <a:ln>
+                            <a:solidFill>
+                              <a:schemeClr val="tx1"/>
+                            </a:solidFill>
+                          </a:ln>
+                          <a:solidFill>
+                            <a:schemeClr val="tx1"/>
+                          </a:solidFill>
+                        </a:rPr>
+                        <a:t>1</a:t>
+                      </a:r>
+                      <a:endParaRPr lang="zh-CN" altLang="en-US" b="0" dirty="0">
+                        <a:ln>
+                          <a:solidFill>
+                            <a:schemeClr val="tx1"/>
+                          </a:solidFill>
+                        </a:ln>
+                        <a:solidFill>
+                          <a:schemeClr val="tx1"/>
+                        </a:solidFill>
+                      </a:endParaRPr>
+                    </a:p>
+                  </a:txBody>
+                  <a:tcPr>
+                    <a:lnL w="12700" cap="flat" cmpd="sng" algn="ctr">
+                      <a:solidFill>
+                        <a:schemeClr val="tx1"/>
+                      </a:solidFill>
+                      <a:prstDash val="solid"/>
+                      <a:round/>
+                      <a:headEnd type="none" w="med" len="med"/>
+                      <a:tailEnd type="none" w="med" len="med"/>
+                    </a:lnL>
+                    <a:lnR w="12700" cap="flat" cmpd="sng" algn="ctr">
+                      <a:solidFill>
+                        <a:schemeClr val="tx1"/>
+                      </a:solidFill>
+                      <a:prstDash val="solid"/>
+                      <a:round/>
+                      <a:headEnd type="none" w="med" len="med"/>
+                      <a:tailEnd type="none" w="med" len="med"/>
+                    </a:lnR>
+                    <a:lnT w="12700" cap="flat" cmpd="sng" algn="ctr">
+                      <a:solidFill>
+                        <a:schemeClr val="tx1"/>
+                      </a:solidFill>
+                      <a:prstDash val="solid"/>
+                      <a:round/>
+                      <a:headEnd type="none" w="med" len="med"/>
+                      <a:tailEnd type="none" w="med" len="med"/>
+                    </a:lnT>
+                    <a:lnB w="12700" cap="flat" cmpd="sng" algn="ctr">
+                      <a:solidFill>
+                        <a:schemeClr val="tx1"/>
+                      </a:solidFill>
+                      <a:prstDash val="solid"/>
+                      <a:round/>
+                      <a:headEnd type="none" w="med" len="med"/>
+                      <a:tailEnd type="none" w="med" len="med"/>
+                    </a:lnB>
+                    <a:lnTlToBr w="12700" cmpd="sng">
+                      <a:noFill/>
+                      <a:prstDash val="solid"/>
+                    </a:lnTlToBr>
+                    <a:lnBlToTr w="12700" cmpd="sng">
+                      <a:noFill/>
+                      <a:prstDash val="solid"/>
+                    </a:lnBlToTr>
+                    <a:solidFill>
+                      <a:schemeClr val="bg1"/>
+                    </a:solidFill>
+                  </a:tcPr>
+                </a:tc>
+                <a:tc>
+                  <a:txBody>
+                    <a:bodyPr/>
+                    <a:lstStyle/>
+                    <a:p>
+                      <a:pPr algn="ctr"/>
+                      <a:r>
+                        <a:rPr lang="en-US" altLang="zh-CN" b="0" dirty="0">
+                          <a:ln>
+                            <a:solidFill>
+                              <a:schemeClr val="tx1"/>
+                            </a:solidFill>
+                          </a:ln>
+                          <a:solidFill>
+                            <a:schemeClr val="tx1"/>
+                          </a:solidFill>
+                        </a:rPr>
+                        <a:t>Rd</a:t>
+                      </a:r>
+                    </a:p>
+                  </a:txBody>
+                  <a:tcPr>
+                    <a:lnL w="12700" cap="flat" cmpd="sng" algn="ctr">
+                      <a:solidFill>
+                        <a:schemeClr val="tx1"/>
+                      </a:solidFill>
+                      <a:prstDash val="solid"/>
+                      <a:round/>
+                      <a:headEnd type="none" w="med" len="med"/>
+                      <a:tailEnd type="none" w="med" len="med"/>
+                    </a:lnL>
+                    <a:lnR w="12700" cap="flat" cmpd="sng" algn="ctr">
+                      <a:solidFill>
+                        <a:schemeClr val="tx1"/>
+                      </a:solidFill>
+                      <a:prstDash val="solid"/>
+                      <a:round/>
+                      <a:headEnd type="none" w="med" len="med"/>
+                      <a:tailEnd type="none" w="med" len="med"/>
+                    </a:lnR>
+                    <a:lnT w="12700" cap="flat" cmpd="sng" algn="ctr">
+                      <a:solidFill>
+                        <a:schemeClr val="tx1"/>
+                      </a:solidFill>
+                      <a:prstDash val="solid"/>
+                      <a:round/>
+                      <a:headEnd type="none" w="med" len="med"/>
+                      <a:tailEnd type="none" w="med" len="med"/>
+                    </a:lnT>
+                    <a:lnB w="12700" cap="flat" cmpd="sng" algn="ctr">
+                      <a:solidFill>
+                        <a:schemeClr val="tx1"/>
+                      </a:solidFill>
+                      <a:prstDash val="solid"/>
+                      <a:round/>
+                      <a:headEnd type="none" w="med" len="med"/>
+                      <a:tailEnd type="none" w="med" len="med"/>
+                    </a:lnB>
+                    <a:lnTlToBr w="12700" cmpd="sng">
+                      <a:noFill/>
+                      <a:prstDash val="solid"/>
+                    </a:lnTlToBr>
+                    <a:lnBlToTr w="12700" cmpd="sng">
+                      <a:noFill/>
+                      <a:prstDash val="solid"/>
+                    </a:lnBlToTr>
+                    <a:solidFill>
+                      <a:schemeClr val="bg1"/>
+                    </a:solidFill>
+                  </a:tcPr>
+                </a:tc>
+                <a:tc>
+                  <a:txBody>
+                    <a:bodyPr/>
+                    <a:lstStyle/>
+                    <a:p>
+                      <a:pPr algn="ctr"/>
+                      <a:r>
+                        <a:rPr lang="en-US" altLang="zh-CN" b="0" dirty="0">
+                          <a:ln>
+                            <a:solidFill>
+                              <a:schemeClr val="tx1"/>
+                            </a:solidFill>
+                          </a:ln>
+                          <a:solidFill>
+                            <a:schemeClr val="tx1"/>
+                          </a:solidFill>
+                        </a:rPr>
+                        <a:t>opcode</a:t>
+                      </a:r>
+                      <a:endParaRPr lang="zh-CN" altLang="en-US" b="0" dirty="0">
+                        <a:ln>
+                          <a:solidFill>
+                            <a:schemeClr val="tx1"/>
+                          </a:solidFill>
+                        </a:ln>
+                        <a:solidFill>
+                          <a:schemeClr val="tx1"/>
+                        </a:solidFill>
+                      </a:endParaRPr>
+                    </a:p>
+                  </a:txBody>
+                  <a:tcPr>
+                    <a:lnL w="12700" cap="flat" cmpd="sng" algn="ctr">
+                      <a:solidFill>
+                        <a:schemeClr val="tx1"/>
+                      </a:solidFill>
+                      <a:prstDash val="solid"/>
+                      <a:round/>
+                      <a:headEnd type="none" w="med" len="med"/>
+                      <a:tailEnd type="none" w="med" len="med"/>
+                    </a:lnL>
+                    <a:lnR w="12700" cap="flat" cmpd="sng" algn="ctr">
+                      <a:solidFill>
+                        <a:schemeClr val="tx1"/>
+                      </a:solidFill>
+                      <a:prstDash val="solid"/>
+                      <a:round/>
+                      <a:headEnd type="none" w="med" len="med"/>
+                      <a:tailEnd type="none" w="med" len="med"/>
+                    </a:lnR>
+                    <a:lnT w="12700" cap="flat" cmpd="sng" algn="ctr">
+                      <a:solidFill>
+                        <a:schemeClr val="tx1"/>
+                      </a:solidFill>
+                      <a:prstDash val="solid"/>
+                      <a:round/>
+                      <a:headEnd type="none" w="med" len="med"/>
+                      <a:tailEnd type="none" w="med" len="med"/>
+                    </a:lnT>
+                    <a:lnB w="12700" cap="flat" cmpd="sng" algn="ctr">
+                      <a:solidFill>
+                        <a:schemeClr val="tx1"/>
+                      </a:solidFill>
+                      <a:prstDash val="solid"/>
+                      <a:round/>
+                      <a:headEnd type="none" w="med" len="med"/>
+                      <a:tailEnd type="none" w="med" len="med"/>
+                    </a:lnB>
+                    <a:lnTlToBr w="12700" cmpd="sng">
+                      <a:noFill/>
+                      <a:prstDash val="solid"/>
+                    </a:lnTlToBr>
+                    <a:lnBlToTr w="12700" cmpd="sng">
+                      <a:noFill/>
+                      <a:prstDash val="solid"/>
+                    </a:lnBlToTr>
+                    <a:solidFill>
+                      <a:schemeClr val="bg1"/>
+                    </a:solidFill>
+                  </a:tcPr>
+                </a:tc>
+                <a:tc>
+                  <a:txBody>
+                    <a:bodyPr/>
+                    <a:lstStyle/>
+                    <a:p>
+                      <a:pPr algn="ctr"/>
+                      <a:r>
+                        <a:rPr lang="en-US" altLang="zh-CN" b="0" dirty="0" err="1">
+                          <a:ln>
+                            <a:solidFill>
+                              <a:schemeClr val="tx1"/>
+                            </a:solidFill>
+                          </a:ln>
+                          <a:solidFill>
+                            <a:schemeClr val="tx1"/>
+                          </a:solidFill>
+                        </a:rPr>
+                        <a:t>cond</a:t>
+                      </a:r>
+                      <a:endParaRPr lang="zh-CN" altLang="en-US" b="0" dirty="0">
+                        <a:ln>
+                          <a:solidFill>
+                            <a:schemeClr val="tx1"/>
+                          </a:solidFill>
+                        </a:ln>
+                        <a:solidFill>
+                          <a:schemeClr val="tx1"/>
+                        </a:solidFill>
+                      </a:endParaRPr>
+                    </a:p>
+                  </a:txBody>
+                  <a:tcPr>
+                    <a:lnL w="12700" cap="flat" cmpd="sng" algn="ctr">
+                      <a:solidFill>
+                        <a:schemeClr val="tx1"/>
+                      </a:solidFill>
+                      <a:prstDash val="solid"/>
+                      <a:round/>
+                      <a:headEnd type="none" w="med" len="med"/>
+                      <a:tailEnd type="none" w="med" len="med"/>
+                    </a:lnL>
+                    <a:lnR w="12700" cap="flat" cmpd="sng" algn="ctr">
+                      <a:solidFill>
+                        <a:schemeClr val="tx1"/>
+                      </a:solidFill>
+                      <a:prstDash val="solid"/>
+                      <a:round/>
+                      <a:headEnd type="none" w="med" len="med"/>
+                      <a:tailEnd type="none" w="med" len="med"/>
+                    </a:lnR>
+                    <a:lnT w="12700" cap="flat" cmpd="sng" algn="ctr">
+                      <a:solidFill>
+                        <a:schemeClr val="tx1"/>
+                      </a:solidFill>
+                      <a:prstDash val="solid"/>
+                      <a:round/>
+                      <a:headEnd type="none" w="med" len="med"/>
+                      <a:tailEnd type="none" w="med" len="med"/>
+                    </a:lnT>
+                    <a:lnB w="12700" cap="flat" cmpd="sng" algn="ctr">
+                      <a:solidFill>
+                        <a:schemeClr val="tx1"/>
+                      </a:solidFill>
+                      <a:prstDash val="solid"/>
+                      <a:round/>
+                      <a:headEnd type="none" w="med" len="med"/>
+                      <a:tailEnd type="none" w="med" len="med"/>
+                    </a:lnB>
+                    <a:lnTlToBr w="12700" cmpd="sng">
+                      <a:noFill/>
+                      <a:prstDash val="solid"/>
+                    </a:lnTlToBr>
+                    <a:lnBlToTr w="12700" cmpd="sng">
+                      <a:noFill/>
+                      <a:prstDash val="solid"/>
+                    </a:lnBlToTr>
+                    <a:solidFill>
+                      <a:schemeClr val="bg1"/>
+                    </a:solidFill>
+                  </a:tcPr>
+                </a:tc>
+                <a:extLst>
+                  <a:ext uri="{0D108BD9-81ED-4DB2-BD59-A6C34878D82A}">
+                    <a16:rowId xmlns:a16="http://schemas.microsoft.com/office/drawing/2014/main" val="441353489"/>
+                  </a:ext>
+                </a:extLst>
+              </a:tr>
+            </a:tbl>
+          </a:graphicData>
+        </a:graphic>
+      </p:graphicFrame>
+      <p:sp>
+        <p:nvSpPr>
+          <p:cNvPr id="12" name="文本框 11">
+            <a:extLst>
+              <a:ext uri="{FF2B5EF4-FFF2-40B4-BE49-F238E27FC236}">
+                <a16:creationId xmlns:a16="http://schemas.microsoft.com/office/drawing/2014/main" id="{C7970E5E-C39B-BAFD-72DD-96EEB9F5072F}"/>
+              </a:ext>
+            </a:extLst>
+          </p:cNvPr>
+          <p:cNvSpPr txBox="1"/>
+          <p:nvPr/>
+        </p:nvSpPr>
+        <p:spPr>
+          <a:xfrm>
+            <a:off x="2411073" y="1188672"/>
+            <a:ext cx="306494" cy="369332"/>
+          </a:xfrm>
+          <a:prstGeom prst="rect">
+            <a:avLst/>
+          </a:prstGeom>
+          <a:noFill/>
+        </p:spPr>
+        <p:txBody>
+          <a:bodyPr wrap="none" rtlCol="0">
+            <a:spAutoFit/>
+          </a:bodyPr>
+          <a:lstStyle/>
+          <a:p>
+            <a:r>
+              <a:rPr kumimoji="1" lang="en-US" altLang="zh-CN" dirty="0"/>
+              <a:t>7</a:t>
+            </a:r>
+            <a:endParaRPr kumimoji="1" lang="zh-CN" altLang="en-US" dirty="0"/>
+          </a:p>
+        </p:txBody>
+      </p:sp>
+      <p:sp>
+        <p:nvSpPr>
+          <p:cNvPr id="13" name="文本框 12">
+            <a:extLst>
+              <a:ext uri="{FF2B5EF4-FFF2-40B4-BE49-F238E27FC236}">
+                <a16:creationId xmlns:a16="http://schemas.microsoft.com/office/drawing/2014/main" id="{B26A9452-8D98-E1B0-2F4F-C33FE0AD5EF6}"/>
+              </a:ext>
+            </a:extLst>
+          </p:cNvPr>
+          <p:cNvSpPr txBox="1"/>
+          <p:nvPr/>
+        </p:nvSpPr>
+        <p:spPr>
+          <a:xfrm>
+            <a:off x="3009733" y="1188534"/>
+            <a:ext cx="306494" cy="369332"/>
+          </a:xfrm>
+          <a:prstGeom prst="rect">
+            <a:avLst/>
+          </a:prstGeom>
+          <a:noFill/>
+        </p:spPr>
+        <p:txBody>
+          <a:bodyPr wrap="none" rtlCol="0">
+            <a:spAutoFit/>
+          </a:bodyPr>
+          <a:lstStyle/>
+          <a:p>
+            <a:r>
+              <a:rPr kumimoji="1" lang="en-US" altLang="zh-CN" dirty="0"/>
+              <a:t>6</a:t>
+            </a:r>
+            <a:endParaRPr kumimoji="1" lang="zh-CN" altLang="en-US" dirty="0"/>
+          </a:p>
+        </p:txBody>
+      </p:sp>
+      <p:sp>
+        <p:nvSpPr>
+          <p:cNvPr id="14" name="文本框 13">
+            <a:extLst>
+              <a:ext uri="{FF2B5EF4-FFF2-40B4-BE49-F238E27FC236}">
+                <a16:creationId xmlns:a16="http://schemas.microsoft.com/office/drawing/2014/main" id="{F90D35D9-71CB-8A8D-3157-CCDEB827F1F5}"/>
+              </a:ext>
+            </a:extLst>
+          </p:cNvPr>
+          <p:cNvSpPr txBox="1"/>
+          <p:nvPr/>
+        </p:nvSpPr>
+        <p:spPr>
+          <a:xfrm>
+            <a:off x="4819749" y="1188534"/>
+            <a:ext cx="553357" cy="369332"/>
+          </a:xfrm>
+          <a:prstGeom prst="rect">
+            <a:avLst/>
+          </a:prstGeom>
+          <a:noFill/>
+        </p:spPr>
+        <p:txBody>
+          <a:bodyPr wrap="none" rtlCol="0">
+            <a:spAutoFit/>
+          </a:bodyPr>
+          <a:lstStyle/>
+          <a:p>
+            <a:r>
+              <a:rPr kumimoji="1" lang="en-US" altLang="zh-CN" dirty="0"/>
+              <a:t>5  4</a:t>
+            </a:r>
+            <a:endParaRPr kumimoji="1" lang="zh-CN" altLang="en-US" dirty="0"/>
+          </a:p>
+        </p:txBody>
+      </p:sp>
+      <p:sp>
+        <p:nvSpPr>
+          <p:cNvPr id="15" name="文本框 14">
+            <a:extLst>
+              <a:ext uri="{FF2B5EF4-FFF2-40B4-BE49-F238E27FC236}">
+                <a16:creationId xmlns:a16="http://schemas.microsoft.com/office/drawing/2014/main" id="{09231C7F-F475-10F5-4971-B767CAFAAEEE}"/>
+              </a:ext>
+            </a:extLst>
+          </p:cNvPr>
+          <p:cNvSpPr txBox="1"/>
+          <p:nvPr/>
+        </p:nvSpPr>
+        <p:spPr>
+          <a:xfrm>
+            <a:off x="7854779" y="1188672"/>
+            <a:ext cx="553357" cy="369332"/>
+          </a:xfrm>
+          <a:prstGeom prst="rect">
+            <a:avLst/>
+          </a:prstGeom>
+          <a:noFill/>
+        </p:spPr>
+        <p:txBody>
+          <a:bodyPr wrap="none" rtlCol="0">
+            <a:spAutoFit/>
+          </a:bodyPr>
+          <a:lstStyle/>
+          <a:p>
+            <a:r>
+              <a:rPr kumimoji="1" lang="en-US" altLang="zh-CN" dirty="0"/>
+              <a:t>2  1</a:t>
+            </a:r>
+            <a:endParaRPr kumimoji="1" lang="zh-CN" altLang="en-US" dirty="0"/>
+          </a:p>
+        </p:txBody>
+      </p:sp>
+      <p:sp>
+        <p:nvSpPr>
+          <p:cNvPr id="16" name="文本框 15">
+            <a:extLst>
+              <a:ext uri="{FF2B5EF4-FFF2-40B4-BE49-F238E27FC236}">
+                <a16:creationId xmlns:a16="http://schemas.microsoft.com/office/drawing/2014/main" id="{1D228796-4D6E-B2DE-D66F-EF52BE9E8855}"/>
+              </a:ext>
+            </a:extLst>
+          </p:cNvPr>
+          <p:cNvSpPr txBox="1"/>
+          <p:nvPr/>
+        </p:nvSpPr>
+        <p:spPr>
+          <a:xfrm>
+            <a:off x="9911658" y="1188672"/>
+            <a:ext cx="306494" cy="369332"/>
+          </a:xfrm>
+          <a:prstGeom prst="rect">
+            <a:avLst/>
+          </a:prstGeom>
+          <a:noFill/>
+        </p:spPr>
+        <p:txBody>
+          <a:bodyPr wrap="none" rtlCol="0">
+            <a:spAutoFit/>
+          </a:bodyPr>
+          <a:lstStyle/>
+          <a:p>
+            <a:r>
+              <a:rPr kumimoji="1" lang="en-US" altLang="zh-CN" dirty="0"/>
+              <a:t>0</a:t>
+            </a:r>
+            <a:endParaRPr kumimoji="1" lang="zh-CN" altLang="en-US" dirty="0"/>
+          </a:p>
+        </p:txBody>
+      </p:sp>
+      <p:sp>
+        <p:nvSpPr>
+          <p:cNvPr id="17" name="文本框 16">
+            <a:extLst>
+              <a:ext uri="{FF2B5EF4-FFF2-40B4-BE49-F238E27FC236}">
+                <a16:creationId xmlns:a16="http://schemas.microsoft.com/office/drawing/2014/main" id="{0B48A061-1EED-12A0-EDD1-D9915AF60379}"/>
+              </a:ext>
+            </a:extLst>
+          </p:cNvPr>
+          <p:cNvSpPr txBox="1"/>
+          <p:nvPr/>
+        </p:nvSpPr>
+        <p:spPr>
+          <a:xfrm>
+            <a:off x="196586" y="350334"/>
+            <a:ext cx="1922321" cy="923330"/>
+          </a:xfrm>
+          <a:prstGeom prst="rect">
+            <a:avLst/>
+          </a:prstGeom>
+          <a:noFill/>
+        </p:spPr>
+        <p:txBody>
+          <a:bodyPr wrap="none" rtlCol="0">
+            <a:spAutoFit/>
+          </a:bodyPr>
+          <a:lstStyle/>
+          <a:p>
+            <a:r>
+              <a:rPr kumimoji="1" lang="en-US" altLang="zh-CN" dirty="0"/>
+              <a:t>Rm</a:t>
+            </a:r>
+            <a:r>
+              <a:rPr kumimoji="1" lang="zh-CN" altLang="en-US" dirty="0"/>
+              <a:t>：</a:t>
+            </a:r>
+            <a:endParaRPr kumimoji="1" lang="en-US" altLang="zh-CN" dirty="0"/>
+          </a:p>
+          <a:p>
+            <a:r>
+              <a:rPr kumimoji="1" lang="en-US" altLang="zh-CN" dirty="0"/>
+              <a:t>7</a:t>
+            </a:r>
+            <a:r>
+              <a:rPr kumimoji="1" lang="zh-CN" altLang="en-US" dirty="0"/>
+              <a:t>位</a:t>
+            </a:r>
+            <a:r>
+              <a:rPr kumimoji="1" lang="en-US" altLang="zh-CN" dirty="0"/>
+              <a:t>2</a:t>
+            </a:r>
+            <a:r>
+              <a:rPr kumimoji="1" lang="zh-CN" altLang="en-US" dirty="0"/>
+              <a:t>进制数</a:t>
+            </a:r>
+            <a:endParaRPr kumimoji="1" lang="en-US" altLang="zh-CN" dirty="0"/>
+          </a:p>
+          <a:p>
+            <a:r>
+              <a:rPr kumimoji="1" lang="zh-CN" altLang="en-US" dirty="0"/>
+              <a:t>存入寄存器</a:t>
+            </a:r>
+            <a:r>
+              <a:rPr kumimoji="1" lang="en-US" altLang="zh-CN" dirty="0"/>
+              <a:t>1</a:t>
+            </a:r>
+            <a:r>
+              <a:rPr kumimoji="1" lang="zh-CN" altLang="en-US" dirty="0"/>
+              <a:t>中。</a:t>
+            </a:r>
+          </a:p>
+        </p:txBody>
+      </p:sp>
+      <p:sp>
+        <p:nvSpPr>
+          <p:cNvPr id="18" name="文本框 17">
+            <a:extLst>
+              <a:ext uri="{FF2B5EF4-FFF2-40B4-BE49-F238E27FC236}">
+                <a16:creationId xmlns:a16="http://schemas.microsoft.com/office/drawing/2014/main" id="{4F7F7BA0-9DC2-D05B-7067-DD54FAD90A5E}"/>
+              </a:ext>
+            </a:extLst>
+          </p:cNvPr>
+          <p:cNvSpPr txBox="1"/>
+          <p:nvPr/>
+        </p:nvSpPr>
+        <p:spPr>
+          <a:xfrm>
+            <a:off x="585216" y="2606040"/>
+            <a:ext cx="2989921" cy="1477328"/>
+          </a:xfrm>
+          <a:prstGeom prst="rect">
+            <a:avLst/>
+          </a:prstGeom>
+          <a:noFill/>
+        </p:spPr>
+        <p:txBody>
+          <a:bodyPr wrap="none" rtlCol="0">
+            <a:spAutoFit/>
+          </a:bodyPr>
+          <a:lstStyle/>
+          <a:p>
+            <a:r>
+              <a:rPr kumimoji="1" lang="en-US" altLang="zh-CN" dirty="0"/>
+              <a:t>Rd</a:t>
+            </a:r>
+            <a:r>
+              <a:rPr kumimoji="1" lang="zh-CN" altLang="en-US" dirty="0"/>
+              <a:t>：目的操作数寄存器</a:t>
+            </a:r>
+            <a:endParaRPr kumimoji="1" lang="en-US" altLang="zh-CN" dirty="0"/>
+          </a:p>
+          <a:p>
+            <a:r>
+              <a:rPr kumimoji="1" lang="en-US" altLang="zh-CN" dirty="0"/>
+              <a:t>00:</a:t>
+            </a:r>
+            <a:r>
+              <a:rPr kumimoji="1" lang="zh-CN" altLang="en-US" dirty="0"/>
+              <a:t>寄存器</a:t>
+            </a:r>
+            <a:r>
+              <a:rPr kumimoji="1" lang="en-US" altLang="zh-CN" dirty="0"/>
+              <a:t>1</a:t>
+            </a:r>
+            <a:r>
+              <a:rPr kumimoji="1" lang="zh-CN" altLang="en-US" dirty="0"/>
+              <a:t>（</a:t>
+            </a:r>
+            <a:r>
+              <a:rPr kumimoji="1" lang="en-US" altLang="zh-CN" dirty="0"/>
+              <a:t>R1</a:t>
+            </a:r>
+            <a:r>
+              <a:rPr kumimoji="1" lang="zh-CN" altLang="en-US" dirty="0"/>
+              <a:t>）</a:t>
+            </a:r>
+            <a:endParaRPr kumimoji="1" lang="en-US" altLang="zh-CN" dirty="0"/>
+          </a:p>
+          <a:p>
+            <a:r>
+              <a:rPr kumimoji="1" lang="en-US" altLang="zh-CN" dirty="0"/>
+              <a:t>01:</a:t>
+            </a:r>
+            <a:r>
+              <a:rPr kumimoji="1" lang="zh-CN" altLang="en-US" dirty="0"/>
+              <a:t>寄存器</a:t>
+            </a:r>
+            <a:r>
+              <a:rPr kumimoji="1" lang="en-US" altLang="zh-CN" dirty="0"/>
+              <a:t>0</a:t>
+            </a:r>
+            <a:r>
+              <a:rPr kumimoji="1" lang="zh-CN" altLang="en-US" dirty="0"/>
+              <a:t>（</a:t>
+            </a:r>
+            <a:r>
+              <a:rPr kumimoji="1" lang="en-US" altLang="zh-CN" dirty="0"/>
+              <a:t>R0</a:t>
+            </a:r>
+            <a:r>
+              <a:rPr kumimoji="1" lang="zh-CN" altLang="en-US" dirty="0"/>
+              <a:t>）</a:t>
+            </a:r>
+            <a:endParaRPr kumimoji="1" lang="en-US" altLang="zh-CN" dirty="0"/>
+          </a:p>
+          <a:p>
+            <a:r>
+              <a:rPr kumimoji="1" lang="en-US" altLang="zh-CN" dirty="0"/>
+              <a:t>10:</a:t>
+            </a:r>
+            <a:r>
+              <a:rPr kumimoji="1" lang="zh-CN" altLang="en-US" dirty="0"/>
+              <a:t>内存地址</a:t>
+            </a:r>
+            <a:r>
+              <a:rPr kumimoji="1" lang="en-US" altLang="zh-CN" dirty="0"/>
+              <a:t>R1</a:t>
+            </a:r>
+            <a:r>
+              <a:rPr kumimoji="1" lang="zh-CN" altLang="en-US" dirty="0"/>
+              <a:t>（</a:t>
+            </a:r>
+            <a:r>
+              <a:rPr kumimoji="1" lang="en-US" altLang="zh-CN" dirty="0"/>
+              <a:t>RAM[R1]</a:t>
+            </a:r>
+            <a:r>
+              <a:rPr kumimoji="1" lang="zh-CN" altLang="en-US" dirty="0"/>
+              <a:t>）</a:t>
+            </a:r>
+            <a:endParaRPr kumimoji="1" lang="en-US" altLang="zh-CN" dirty="0"/>
+          </a:p>
+          <a:p>
+            <a:r>
+              <a:rPr kumimoji="1" lang="en-US" altLang="zh-CN" dirty="0"/>
+              <a:t>11:</a:t>
+            </a:r>
+            <a:r>
+              <a:rPr kumimoji="1" lang="zh-CN" altLang="en-US" dirty="0"/>
+              <a:t>遗弃</a:t>
+            </a:r>
+          </a:p>
+        </p:txBody>
+      </p:sp>
+      <p:sp>
+        <p:nvSpPr>
+          <p:cNvPr id="19" name="文本框 18">
+            <a:extLst>
+              <a:ext uri="{FF2B5EF4-FFF2-40B4-BE49-F238E27FC236}">
+                <a16:creationId xmlns:a16="http://schemas.microsoft.com/office/drawing/2014/main" id="{7464D06E-FB67-F7F3-BFC2-A0BBB8C437EF}"/>
+              </a:ext>
+            </a:extLst>
+          </p:cNvPr>
+          <p:cNvSpPr txBox="1"/>
+          <p:nvPr/>
+        </p:nvSpPr>
+        <p:spPr>
+          <a:xfrm>
+            <a:off x="3965289" y="2606040"/>
+            <a:ext cx="2361544" cy="2585323"/>
+          </a:xfrm>
+          <a:prstGeom prst="rect">
+            <a:avLst/>
+          </a:prstGeom>
+          <a:noFill/>
+        </p:spPr>
+        <p:txBody>
+          <a:bodyPr wrap="none" rtlCol="0">
+            <a:spAutoFit/>
+          </a:bodyPr>
+          <a:lstStyle/>
+          <a:p>
+            <a:r>
+              <a:rPr kumimoji="1" lang="en-US" altLang="zh-CN" dirty="0"/>
+              <a:t>opcode</a:t>
+            </a:r>
+            <a:r>
+              <a:rPr kumimoji="1" lang="zh-CN" altLang="en-US" dirty="0"/>
+              <a:t>：操作码</a:t>
+            </a:r>
+            <a:endParaRPr kumimoji="1" lang="en-US" altLang="zh-CN" dirty="0"/>
+          </a:p>
+          <a:p>
+            <a:r>
+              <a:rPr kumimoji="1" lang="en-US" altLang="zh-CN" dirty="0"/>
+              <a:t>000:Rd=R1</a:t>
+            </a:r>
+          </a:p>
+          <a:p>
+            <a:r>
+              <a:rPr kumimoji="1" lang="en-US" altLang="zh-CN" dirty="0"/>
+              <a:t>001:Rd=-R1</a:t>
+            </a:r>
+          </a:p>
+          <a:p>
+            <a:r>
+              <a:rPr kumimoji="1" lang="en-US" altLang="zh-CN" dirty="0"/>
+              <a:t>010:Rd=R0+R1+Carry</a:t>
+            </a:r>
+          </a:p>
+          <a:p>
+            <a:r>
+              <a:rPr kumimoji="1" lang="en-US" altLang="zh-CN" dirty="0"/>
+              <a:t>011:Rd=R0</a:t>
+            </a:r>
+          </a:p>
+          <a:p>
+            <a:r>
+              <a:rPr kumimoji="1" lang="en-US" altLang="zh-CN" dirty="0"/>
+              <a:t>100:Rd=RAM[R1]</a:t>
+            </a:r>
+          </a:p>
+          <a:p>
+            <a:r>
+              <a:rPr kumimoji="1" lang="en-US" altLang="zh-CN" dirty="0"/>
+              <a:t>101:Rd=</a:t>
+            </a:r>
+            <a:r>
+              <a:rPr kumimoji="1" lang="en-US" altLang="zh-CN" i="1" dirty="0"/>
+              <a:t>NOT</a:t>
+            </a:r>
+            <a:r>
+              <a:rPr kumimoji="1" lang="zh-CN" altLang="en-US" dirty="0"/>
+              <a:t> </a:t>
+            </a:r>
+            <a:r>
+              <a:rPr kumimoji="1" lang="en-US" altLang="zh-CN" dirty="0"/>
+              <a:t>R0</a:t>
+            </a:r>
+          </a:p>
+          <a:p>
+            <a:r>
+              <a:rPr kumimoji="1" lang="en-US" altLang="zh-CN" dirty="0"/>
+              <a:t>110:Rd=R0+R1</a:t>
+            </a:r>
+          </a:p>
+          <a:p>
+            <a:r>
+              <a:rPr kumimoji="1" lang="en-US" altLang="zh-CN" dirty="0"/>
+              <a:t>111:Rd=R0</a:t>
+            </a:r>
+            <a:r>
+              <a:rPr kumimoji="1" lang="zh-CN" altLang="en-US" dirty="0"/>
+              <a:t> </a:t>
+            </a:r>
+            <a:r>
+              <a:rPr kumimoji="1" lang="en-US" altLang="zh-CN" b="1" i="1" dirty="0"/>
+              <a:t>X</a:t>
+            </a:r>
+            <a:r>
+              <a:rPr kumimoji="1" lang="en-US" altLang="zh-CN" i="1" dirty="0"/>
+              <a:t>OR</a:t>
+            </a:r>
+            <a:r>
+              <a:rPr kumimoji="1" lang="zh-CN" altLang="en-US" dirty="0"/>
+              <a:t> </a:t>
+            </a:r>
+            <a:r>
+              <a:rPr kumimoji="1" lang="en-US" altLang="zh-CN" dirty="0"/>
+              <a:t>R1</a:t>
+            </a:r>
+          </a:p>
+        </p:txBody>
+      </p:sp>
+      <p:sp>
+        <p:nvSpPr>
+          <p:cNvPr id="20" name="文本框 19">
+            <a:extLst>
+              <a:ext uri="{FF2B5EF4-FFF2-40B4-BE49-F238E27FC236}">
+                <a16:creationId xmlns:a16="http://schemas.microsoft.com/office/drawing/2014/main" id="{FC14E48C-BE5A-FE29-40FF-425267B8CD84}"/>
+              </a:ext>
+            </a:extLst>
+          </p:cNvPr>
+          <p:cNvSpPr txBox="1"/>
+          <p:nvPr/>
+        </p:nvSpPr>
+        <p:spPr>
+          <a:xfrm>
+            <a:off x="7328993" y="2606040"/>
+            <a:ext cx="3385863" cy="1477328"/>
+          </a:xfrm>
+          <a:prstGeom prst="rect">
+            <a:avLst/>
+          </a:prstGeom>
+          <a:noFill/>
+        </p:spPr>
+        <p:txBody>
+          <a:bodyPr wrap="none" rtlCol="0">
+            <a:spAutoFit/>
+          </a:bodyPr>
+          <a:lstStyle/>
+          <a:p>
+            <a:r>
+              <a:rPr kumimoji="1" lang="en-US" altLang="zh-CN" dirty="0" err="1"/>
+              <a:t>cond</a:t>
+            </a:r>
+            <a:r>
+              <a:rPr kumimoji="1" lang="zh-CN" altLang="en-US" dirty="0"/>
+              <a:t>：条件码，</a:t>
+            </a:r>
+            <a:r>
+              <a:rPr kumimoji="1" lang="en-US" altLang="zh-CN" dirty="0" err="1"/>
+              <a:t>PCregister</a:t>
+            </a:r>
+            <a:r>
+              <a:rPr kumimoji="1" lang="zh-CN" altLang="en-US" dirty="0"/>
+              <a:t> </a:t>
+            </a:r>
+            <a:r>
+              <a:rPr kumimoji="1" lang="en-US" altLang="zh-CN" dirty="0"/>
+              <a:t>=</a:t>
+            </a:r>
+            <a:r>
+              <a:rPr kumimoji="1" lang="zh-CN" altLang="en-US" dirty="0"/>
+              <a:t> </a:t>
+            </a:r>
+            <a:r>
+              <a:rPr kumimoji="1" lang="en-US" altLang="zh-CN" dirty="0"/>
+              <a:t>R1</a:t>
+            </a:r>
+          </a:p>
+          <a:p>
+            <a:r>
+              <a:rPr kumimoji="1" lang="en-US" altLang="zh-CN" dirty="0"/>
+              <a:t>00:</a:t>
+            </a:r>
+            <a:r>
+              <a:rPr kumimoji="1" lang="zh-CN" altLang="en-US" dirty="0"/>
+              <a:t>不执行</a:t>
+            </a:r>
+            <a:endParaRPr kumimoji="1" lang="en-US" altLang="zh-CN" dirty="0"/>
+          </a:p>
+          <a:p>
+            <a:r>
+              <a:rPr kumimoji="1" lang="en-US" altLang="zh-CN" dirty="0"/>
+              <a:t>01:Rd&gt;0</a:t>
+            </a:r>
+          </a:p>
+          <a:p>
+            <a:r>
+              <a:rPr kumimoji="1" lang="en-US" altLang="zh-CN" dirty="0"/>
+              <a:t>10:Rd=0</a:t>
+            </a:r>
+          </a:p>
+          <a:p>
+            <a:r>
+              <a:rPr kumimoji="1" lang="en-US" altLang="zh-CN" dirty="0"/>
+              <a:t>11:</a:t>
+            </a:r>
+            <a:r>
+              <a:rPr kumimoji="1" lang="zh-CN" altLang="en-US" dirty="0"/>
+              <a:t>无条件执行</a:t>
+            </a:r>
+          </a:p>
+        </p:txBody>
+      </p:sp>
+    </p:spTree>
+    <p:extLst>
+      <p:ext uri="{BB962C8B-B14F-4D97-AF65-F5344CB8AC3E}">
+        <p14:creationId xmlns:p14="http://schemas.microsoft.com/office/powerpoint/2010/main" val="598628777"/>
+      </p:ext>
+    </p:extLst>
+  </p:cSld>
+  <p:clrMapOvr>
+    <a:masterClrMapping/>
+  </p:clrMapOvr>
+</p:sld>
+</file>
+
 <file path=ppt/theme/theme1.xml><?xml version="1.0" encoding="utf-8"?>
 <a:theme xmlns:a="http://schemas.openxmlformats.org/drawingml/2006/main" name="Office 主题​​">
   <a:themeElements>

</xml_diff>